<commit_message>
finalized project details and created folder with properly commented code. finalized project report pdf
</commit_message>
<xml_diff>
--- a/Project/figures/Final_Project_Assets.pptx
+++ b/Project/figures/Final_Project_Assets.pptx
@@ -3988,6 +3988,1695 @@
           <a:chExt cx="0" cy="0"/>
         </a:xfrm>
       </p:grpSpPr>
+      <p:sp>
+        <p:nvSpPr>
+          <p:cNvPr id="3" name="Oval 2">
+            <a:extLst>
+              <a:ext uri="{FF2B5EF4-FFF2-40B4-BE49-F238E27FC236}">
+                <a16:creationId xmlns:a16="http://schemas.microsoft.com/office/drawing/2014/main" id="{2F31C8C4-2458-4157-95E2-3C16B3EDC82A}"/>
+              </a:ext>
+            </a:extLst>
+          </p:cNvPr>
+          <p:cNvSpPr/>
+          <p:nvPr/>
+        </p:nvSpPr>
+        <p:spPr>
+          <a:xfrm>
+            <a:off x="3422364" y="1662158"/>
+            <a:ext cx="1371600" cy="1371600"/>
+          </a:xfrm>
+          <a:prstGeom prst="ellipse">
+            <a:avLst/>
+          </a:prstGeom>
+          <a:gradFill flip="none" rotWithShape="1">
+            <a:gsLst>
+              <a:gs pos="0">
+                <a:srgbClr val="FF0000">
+                  <a:alpha val="10000"/>
+                </a:srgbClr>
+              </a:gs>
+              <a:gs pos="74000">
+                <a:schemeClr val="bg1"/>
+              </a:gs>
+              <a:gs pos="83000">
+                <a:schemeClr val="bg1">
+                  <a:alpha val="54000"/>
+                </a:schemeClr>
+              </a:gs>
+              <a:gs pos="100000">
+                <a:schemeClr val="bg1">
+                  <a:alpha val="0"/>
+                </a:schemeClr>
+              </a:gs>
+            </a:gsLst>
+            <a:path path="circle">
+              <a:fillToRect r="100000" b="100000"/>
+            </a:path>
+            <a:tileRect l="-100000" t="-100000"/>
+          </a:gradFill>
+          <a:ln>
+            <a:solidFill>
+              <a:schemeClr val="tx1"/>
+            </a:solidFill>
+          </a:ln>
+        </p:spPr>
+        <p:style>
+          <a:lnRef idx="2">
+            <a:schemeClr val="accent1">
+              <a:shade val="50000"/>
+            </a:schemeClr>
+          </a:lnRef>
+          <a:fillRef idx="1">
+            <a:schemeClr val="accent1"/>
+          </a:fillRef>
+          <a:effectRef idx="0">
+            <a:schemeClr val="accent1"/>
+          </a:effectRef>
+          <a:fontRef idx="minor">
+            <a:schemeClr val="lt1"/>
+          </a:fontRef>
+        </p:style>
+        <p:txBody>
+          <a:bodyPr rtlCol="0" anchor="ctr"/>
+          <a:lstStyle/>
+          <a:p>
+            <a:pPr algn="ctr"/>
+            <a:endParaRPr lang="en-US"/>
+          </a:p>
+        </p:txBody>
+      </p:sp>
+      <p:sp>
+        <p:nvSpPr>
+          <p:cNvPr id="4" name="Oval 3">
+            <a:extLst>
+              <a:ext uri="{FF2B5EF4-FFF2-40B4-BE49-F238E27FC236}">
+                <a16:creationId xmlns:a16="http://schemas.microsoft.com/office/drawing/2014/main" id="{0C8F0FD5-6F53-4326-805D-3498B21539C6}"/>
+              </a:ext>
+            </a:extLst>
+          </p:cNvPr>
+          <p:cNvSpPr/>
+          <p:nvPr/>
+        </p:nvSpPr>
+        <p:spPr>
+          <a:xfrm rot="2525952">
+            <a:off x="3948836" y="2106126"/>
+            <a:ext cx="1371600" cy="1371600"/>
+          </a:xfrm>
+          <a:prstGeom prst="ellipse">
+            <a:avLst/>
+          </a:prstGeom>
+          <a:gradFill flip="none" rotWithShape="1">
+            <a:gsLst>
+              <a:gs pos="0">
+                <a:srgbClr val="FF0000">
+                  <a:alpha val="10000"/>
+                </a:srgbClr>
+              </a:gs>
+              <a:gs pos="74000">
+                <a:schemeClr val="bg1"/>
+              </a:gs>
+              <a:gs pos="83000">
+                <a:schemeClr val="bg1">
+                  <a:alpha val="54000"/>
+                </a:schemeClr>
+              </a:gs>
+              <a:gs pos="100000">
+                <a:schemeClr val="bg1">
+                  <a:alpha val="0"/>
+                </a:schemeClr>
+              </a:gs>
+            </a:gsLst>
+            <a:path path="circle">
+              <a:fillToRect r="100000" b="100000"/>
+            </a:path>
+            <a:tileRect l="-100000" t="-100000"/>
+          </a:gradFill>
+          <a:ln>
+            <a:solidFill>
+              <a:schemeClr val="tx1"/>
+            </a:solidFill>
+          </a:ln>
+        </p:spPr>
+        <p:style>
+          <a:lnRef idx="2">
+            <a:schemeClr val="accent1">
+              <a:shade val="50000"/>
+            </a:schemeClr>
+          </a:lnRef>
+          <a:fillRef idx="1">
+            <a:schemeClr val="accent1"/>
+          </a:fillRef>
+          <a:effectRef idx="0">
+            <a:schemeClr val="accent1"/>
+          </a:effectRef>
+          <a:fontRef idx="minor">
+            <a:schemeClr val="lt1"/>
+          </a:fontRef>
+        </p:style>
+        <p:txBody>
+          <a:bodyPr rtlCol="0" anchor="ctr"/>
+          <a:lstStyle/>
+          <a:p>
+            <a:pPr algn="ctr"/>
+            <a:endParaRPr lang="en-US"/>
+          </a:p>
+        </p:txBody>
+      </p:sp>
+      <p:sp>
+        <p:nvSpPr>
+          <p:cNvPr id="5" name="Oval 4">
+            <a:extLst>
+              <a:ext uri="{FF2B5EF4-FFF2-40B4-BE49-F238E27FC236}">
+                <a16:creationId xmlns:a16="http://schemas.microsoft.com/office/drawing/2014/main" id="{1BB563AF-4C31-42AD-BE51-608CAF0ADFF7}"/>
+              </a:ext>
+            </a:extLst>
+          </p:cNvPr>
+          <p:cNvSpPr/>
+          <p:nvPr/>
+        </p:nvSpPr>
+        <p:spPr>
+          <a:xfrm rot="20683802">
+            <a:off x="4108165" y="2711355"/>
+            <a:ext cx="1371600" cy="1371600"/>
+          </a:xfrm>
+          <a:prstGeom prst="ellipse">
+            <a:avLst/>
+          </a:prstGeom>
+          <a:gradFill flip="none" rotWithShape="1">
+            <a:gsLst>
+              <a:gs pos="0">
+                <a:srgbClr val="FF0000">
+                  <a:alpha val="10000"/>
+                </a:srgbClr>
+              </a:gs>
+              <a:gs pos="74000">
+                <a:schemeClr val="bg1"/>
+              </a:gs>
+              <a:gs pos="83000">
+                <a:schemeClr val="bg1">
+                  <a:alpha val="54000"/>
+                </a:schemeClr>
+              </a:gs>
+              <a:gs pos="100000">
+                <a:schemeClr val="bg1">
+                  <a:alpha val="0"/>
+                </a:schemeClr>
+              </a:gs>
+            </a:gsLst>
+            <a:path path="circle">
+              <a:fillToRect r="100000" b="100000"/>
+            </a:path>
+            <a:tileRect l="-100000" t="-100000"/>
+          </a:gradFill>
+          <a:ln>
+            <a:solidFill>
+              <a:schemeClr val="tx1"/>
+            </a:solidFill>
+          </a:ln>
+        </p:spPr>
+        <p:style>
+          <a:lnRef idx="2">
+            <a:schemeClr val="accent1">
+              <a:shade val="50000"/>
+            </a:schemeClr>
+          </a:lnRef>
+          <a:fillRef idx="1">
+            <a:schemeClr val="accent1"/>
+          </a:fillRef>
+          <a:effectRef idx="0">
+            <a:schemeClr val="accent1"/>
+          </a:effectRef>
+          <a:fontRef idx="minor">
+            <a:schemeClr val="lt1"/>
+          </a:fontRef>
+        </p:style>
+        <p:txBody>
+          <a:bodyPr rtlCol="0" anchor="ctr"/>
+          <a:lstStyle/>
+          <a:p>
+            <a:pPr algn="ctr"/>
+            <a:endParaRPr lang="en-US"/>
+          </a:p>
+        </p:txBody>
+      </p:sp>
+      <p:sp>
+        <p:nvSpPr>
+          <p:cNvPr id="6" name="Oval 5">
+            <a:extLst>
+              <a:ext uri="{FF2B5EF4-FFF2-40B4-BE49-F238E27FC236}">
+                <a16:creationId xmlns:a16="http://schemas.microsoft.com/office/drawing/2014/main" id="{9DDD44C8-D000-4D14-8CC7-E303827CE349}"/>
+              </a:ext>
+            </a:extLst>
+          </p:cNvPr>
+          <p:cNvSpPr/>
+          <p:nvPr/>
+        </p:nvSpPr>
+        <p:spPr>
+          <a:xfrm rot="20683802">
+            <a:off x="4646626" y="2566580"/>
+            <a:ext cx="1724508" cy="1724508"/>
+          </a:xfrm>
+          <a:prstGeom prst="ellipse">
+            <a:avLst/>
+          </a:prstGeom>
+          <a:gradFill flip="none" rotWithShape="1">
+            <a:gsLst>
+              <a:gs pos="0">
+                <a:srgbClr val="FF0000">
+                  <a:alpha val="10000"/>
+                </a:srgbClr>
+              </a:gs>
+              <a:gs pos="74000">
+                <a:schemeClr val="bg1"/>
+              </a:gs>
+              <a:gs pos="83000">
+                <a:schemeClr val="bg1">
+                  <a:alpha val="54000"/>
+                </a:schemeClr>
+              </a:gs>
+              <a:gs pos="100000">
+                <a:schemeClr val="bg1">
+                  <a:alpha val="0"/>
+                </a:schemeClr>
+              </a:gs>
+            </a:gsLst>
+            <a:path path="circle">
+              <a:fillToRect r="100000" b="100000"/>
+            </a:path>
+            <a:tileRect l="-100000" t="-100000"/>
+          </a:gradFill>
+          <a:ln>
+            <a:solidFill>
+              <a:schemeClr val="tx1"/>
+            </a:solidFill>
+          </a:ln>
+        </p:spPr>
+        <p:style>
+          <a:lnRef idx="2">
+            <a:schemeClr val="accent1">
+              <a:shade val="50000"/>
+            </a:schemeClr>
+          </a:lnRef>
+          <a:fillRef idx="1">
+            <a:schemeClr val="accent1"/>
+          </a:fillRef>
+          <a:effectRef idx="0">
+            <a:schemeClr val="accent1"/>
+          </a:effectRef>
+          <a:fontRef idx="minor">
+            <a:schemeClr val="lt1"/>
+          </a:fontRef>
+        </p:style>
+        <p:txBody>
+          <a:bodyPr rtlCol="0" anchor="ctr"/>
+          <a:lstStyle/>
+          <a:p>
+            <a:pPr algn="ctr"/>
+            <a:endParaRPr lang="en-US"/>
+          </a:p>
+        </p:txBody>
+      </p:sp>
+      <p:sp>
+        <p:nvSpPr>
+          <p:cNvPr id="7" name="Oval 6">
+            <a:extLst>
+              <a:ext uri="{FF2B5EF4-FFF2-40B4-BE49-F238E27FC236}">
+                <a16:creationId xmlns:a16="http://schemas.microsoft.com/office/drawing/2014/main" id="{93817277-BF65-4B4D-B8A1-A420E9138D83}"/>
+              </a:ext>
+            </a:extLst>
+          </p:cNvPr>
+          <p:cNvSpPr/>
+          <p:nvPr/>
+        </p:nvSpPr>
+        <p:spPr>
+          <a:xfrm rot="18159675">
+            <a:off x="5430891" y="2566879"/>
+            <a:ext cx="1724240" cy="1724240"/>
+          </a:xfrm>
+          <a:prstGeom prst="ellipse">
+            <a:avLst/>
+          </a:prstGeom>
+          <a:gradFill flip="none" rotWithShape="1">
+            <a:gsLst>
+              <a:gs pos="0">
+                <a:srgbClr val="FF0000">
+                  <a:alpha val="10000"/>
+                </a:srgbClr>
+              </a:gs>
+              <a:gs pos="74000">
+                <a:schemeClr val="bg1"/>
+              </a:gs>
+              <a:gs pos="83000">
+                <a:schemeClr val="bg1">
+                  <a:alpha val="54000"/>
+                </a:schemeClr>
+              </a:gs>
+              <a:gs pos="100000">
+                <a:schemeClr val="bg1">
+                  <a:alpha val="0"/>
+                </a:schemeClr>
+              </a:gs>
+            </a:gsLst>
+            <a:path path="circle">
+              <a:fillToRect r="100000" b="100000"/>
+            </a:path>
+            <a:tileRect l="-100000" t="-100000"/>
+          </a:gradFill>
+          <a:ln>
+            <a:solidFill>
+              <a:schemeClr val="tx1"/>
+            </a:solidFill>
+          </a:ln>
+        </p:spPr>
+        <p:style>
+          <a:lnRef idx="2">
+            <a:schemeClr val="accent1">
+              <a:shade val="50000"/>
+            </a:schemeClr>
+          </a:lnRef>
+          <a:fillRef idx="1">
+            <a:schemeClr val="accent1"/>
+          </a:fillRef>
+          <a:effectRef idx="0">
+            <a:schemeClr val="accent1"/>
+          </a:effectRef>
+          <a:fontRef idx="minor">
+            <a:schemeClr val="lt1"/>
+          </a:fontRef>
+        </p:style>
+        <p:txBody>
+          <a:bodyPr rtlCol="0" anchor="ctr"/>
+          <a:lstStyle/>
+          <a:p>
+            <a:pPr algn="ctr"/>
+            <a:endParaRPr lang="en-US"/>
+          </a:p>
+        </p:txBody>
+      </p:sp>
+      <p:sp>
+        <p:nvSpPr>
+          <p:cNvPr id="8" name="Oval 7">
+            <a:extLst>
+              <a:ext uri="{FF2B5EF4-FFF2-40B4-BE49-F238E27FC236}">
+                <a16:creationId xmlns:a16="http://schemas.microsoft.com/office/drawing/2014/main" id="{9EFCD798-2840-4E18-B0D4-9745A894A921}"/>
+              </a:ext>
+            </a:extLst>
+          </p:cNvPr>
+          <p:cNvSpPr/>
+          <p:nvPr/>
+        </p:nvSpPr>
+        <p:spPr>
+          <a:xfrm rot="819332">
+            <a:off x="6501293" y="2530704"/>
+            <a:ext cx="1103960" cy="1103960"/>
+          </a:xfrm>
+          <a:prstGeom prst="ellipse">
+            <a:avLst/>
+          </a:prstGeom>
+          <a:gradFill flip="none" rotWithShape="1">
+            <a:gsLst>
+              <a:gs pos="0">
+                <a:srgbClr val="FF0000">
+                  <a:alpha val="10000"/>
+                </a:srgbClr>
+              </a:gs>
+              <a:gs pos="74000">
+                <a:schemeClr val="bg1"/>
+              </a:gs>
+              <a:gs pos="83000">
+                <a:schemeClr val="bg1">
+                  <a:alpha val="54000"/>
+                </a:schemeClr>
+              </a:gs>
+              <a:gs pos="100000">
+                <a:schemeClr val="bg1">
+                  <a:alpha val="0"/>
+                </a:schemeClr>
+              </a:gs>
+            </a:gsLst>
+            <a:path path="circle">
+              <a:fillToRect r="100000" b="100000"/>
+            </a:path>
+            <a:tileRect l="-100000" t="-100000"/>
+          </a:gradFill>
+          <a:ln>
+            <a:solidFill>
+              <a:schemeClr val="tx1"/>
+            </a:solidFill>
+          </a:ln>
+        </p:spPr>
+        <p:style>
+          <a:lnRef idx="2">
+            <a:schemeClr val="accent1">
+              <a:shade val="50000"/>
+            </a:schemeClr>
+          </a:lnRef>
+          <a:fillRef idx="1">
+            <a:schemeClr val="accent1"/>
+          </a:fillRef>
+          <a:effectRef idx="0">
+            <a:schemeClr val="accent1"/>
+          </a:effectRef>
+          <a:fontRef idx="minor">
+            <a:schemeClr val="lt1"/>
+          </a:fontRef>
+        </p:style>
+        <p:txBody>
+          <a:bodyPr rtlCol="0" anchor="ctr"/>
+          <a:lstStyle/>
+          <a:p>
+            <a:pPr algn="ctr"/>
+            <a:endParaRPr lang="en-US"/>
+          </a:p>
+        </p:txBody>
+      </p:sp>
+      <p:sp>
+        <p:nvSpPr>
+          <p:cNvPr id="9" name="Oval 8">
+            <a:extLst>
+              <a:ext uri="{FF2B5EF4-FFF2-40B4-BE49-F238E27FC236}">
+                <a16:creationId xmlns:a16="http://schemas.microsoft.com/office/drawing/2014/main" id="{1C84F769-1BB3-4981-B8DB-8E884D127993}"/>
+              </a:ext>
+            </a:extLst>
+          </p:cNvPr>
+          <p:cNvSpPr/>
+          <p:nvPr/>
+        </p:nvSpPr>
+        <p:spPr>
+          <a:xfrm rot="819332">
+            <a:off x="6697886" y="3020691"/>
+            <a:ext cx="1103960" cy="1103960"/>
+          </a:xfrm>
+          <a:prstGeom prst="ellipse">
+            <a:avLst/>
+          </a:prstGeom>
+          <a:gradFill flip="none" rotWithShape="1">
+            <a:gsLst>
+              <a:gs pos="0">
+                <a:srgbClr val="FF0000">
+                  <a:alpha val="10000"/>
+                </a:srgbClr>
+              </a:gs>
+              <a:gs pos="74000">
+                <a:schemeClr val="bg1"/>
+              </a:gs>
+              <a:gs pos="83000">
+                <a:schemeClr val="bg1">
+                  <a:alpha val="54000"/>
+                </a:schemeClr>
+              </a:gs>
+              <a:gs pos="100000">
+                <a:schemeClr val="bg1">
+                  <a:alpha val="0"/>
+                </a:schemeClr>
+              </a:gs>
+            </a:gsLst>
+            <a:path path="circle">
+              <a:fillToRect r="100000" b="100000"/>
+            </a:path>
+            <a:tileRect l="-100000" t="-100000"/>
+          </a:gradFill>
+          <a:ln>
+            <a:solidFill>
+              <a:schemeClr val="tx1"/>
+            </a:solidFill>
+          </a:ln>
+        </p:spPr>
+        <p:style>
+          <a:lnRef idx="2">
+            <a:schemeClr val="accent1">
+              <a:shade val="50000"/>
+            </a:schemeClr>
+          </a:lnRef>
+          <a:fillRef idx="1">
+            <a:schemeClr val="accent1"/>
+          </a:fillRef>
+          <a:effectRef idx="0">
+            <a:schemeClr val="accent1"/>
+          </a:effectRef>
+          <a:fontRef idx="minor">
+            <a:schemeClr val="lt1"/>
+          </a:fontRef>
+        </p:style>
+        <p:txBody>
+          <a:bodyPr rtlCol="0" anchor="ctr"/>
+          <a:lstStyle/>
+          <a:p>
+            <a:pPr algn="ctr"/>
+            <a:endParaRPr lang="en-US"/>
+          </a:p>
+        </p:txBody>
+      </p:sp>
+      <p:sp>
+        <p:nvSpPr>
+          <p:cNvPr id="10" name="Oval 9">
+            <a:extLst>
+              <a:ext uri="{FF2B5EF4-FFF2-40B4-BE49-F238E27FC236}">
+                <a16:creationId xmlns:a16="http://schemas.microsoft.com/office/drawing/2014/main" id="{3AE6DA7A-DCFE-4D23-9F80-43371DE79220}"/>
+              </a:ext>
+            </a:extLst>
+          </p:cNvPr>
+          <p:cNvSpPr/>
+          <p:nvPr/>
+        </p:nvSpPr>
+        <p:spPr>
+          <a:xfrm rot="819332">
+            <a:off x="6917028" y="3562129"/>
+            <a:ext cx="1000076" cy="1000076"/>
+          </a:xfrm>
+          <a:prstGeom prst="ellipse">
+            <a:avLst/>
+          </a:prstGeom>
+          <a:gradFill flip="none" rotWithShape="1">
+            <a:gsLst>
+              <a:gs pos="0">
+                <a:srgbClr val="FF0000">
+                  <a:alpha val="10000"/>
+                </a:srgbClr>
+              </a:gs>
+              <a:gs pos="74000">
+                <a:schemeClr val="bg1"/>
+              </a:gs>
+              <a:gs pos="83000">
+                <a:schemeClr val="bg1">
+                  <a:alpha val="54000"/>
+                </a:schemeClr>
+              </a:gs>
+              <a:gs pos="100000">
+                <a:schemeClr val="bg1">
+                  <a:alpha val="0"/>
+                </a:schemeClr>
+              </a:gs>
+            </a:gsLst>
+            <a:path path="circle">
+              <a:fillToRect r="100000" b="100000"/>
+            </a:path>
+            <a:tileRect l="-100000" t="-100000"/>
+          </a:gradFill>
+          <a:ln>
+            <a:solidFill>
+              <a:schemeClr val="tx1"/>
+            </a:solidFill>
+          </a:ln>
+        </p:spPr>
+        <p:style>
+          <a:lnRef idx="2">
+            <a:schemeClr val="accent1">
+              <a:shade val="50000"/>
+            </a:schemeClr>
+          </a:lnRef>
+          <a:fillRef idx="1">
+            <a:schemeClr val="accent1"/>
+          </a:fillRef>
+          <a:effectRef idx="0">
+            <a:schemeClr val="accent1"/>
+          </a:effectRef>
+          <a:fontRef idx="minor">
+            <a:schemeClr val="lt1"/>
+          </a:fontRef>
+        </p:style>
+        <p:txBody>
+          <a:bodyPr rtlCol="0" anchor="ctr"/>
+          <a:lstStyle/>
+          <a:p>
+            <a:pPr algn="ctr"/>
+            <a:endParaRPr lang="en-US"/>
+          </a:p>
+        </p:txBody>
+      </p:sp>
+      <p:sp>
+        <p:nvSpPr>
+          <p:cNvPr id="11" name="Oval 10">
+            <a:extLst>
+              <a:ext uri="{FF2B5EF4-FFF2-40B4-BE49-F238E27FC236}">
+                <a16:creationId xmlns:a16="http://schemas.microsoft.com/office/drawing/2014/main" id="{3DE6743E-0B9C-4EBA-AA88-830DDE104889}"/>
+              </a:ext>
+            </a:extLst>
+          </p:cNvPr>
+          <p:cNvSpPr/>
+          <p:nvPr/>
+        </p:nvSpPr>
+        <p:spPr>
+          <a:xfrm rot="20415000">
+            <a:off x="7225889" y="4075494"/>
+            <a:ext cx="824485" cy="824485"/>
+          </a:xfrm>
+          <a:prstGeom prst="ellipse">
+            <a:avLst/>
+          </a:prstGeom>
+          <a:gradFill flip="none" rotWithShape="1">
+            <a:gsLst>
+              <a:gs pos="0">
+                <a:srgbClr val="FF0000">
+                  <a:alpha val="10000"/>
+                </a:srgbClr>
+              </a:gs>
+              <a:gs pos="74000">
+                <a:schemeClr val="bg1"/>
+              </a:gs>
+              <a:gs pos="83000">
+                <a:schemeClr val="bg1">
+                  <a:alpha val="54000"/>
+                </a:schemeClr>
+              </a:gs>
+              <a:gs pos="100000">
+                <a:schemeClr val="bg1">
+                  <a:alpha val="0"/>
+                </a:schemeClr>
+              </a:gs>
+            </a:gsLst>
+            <a:path path="circle">
+              <a:fillToRect r="100000" b="100000"/>
+            </a:path>
+            <a:tileRect l="-100000" t="-100000"/>
+          </a:gradFill>
+          <a:ln>
+            <a:solidFill>
+              <a:schemeClr val="tx1"/>
+            </a:solidFill>
+          </a:ln>
+        </p:spPr>
+        <p:style>
+          <a:lnRef idx="2">
+            <a:schemeClr val="accent1">
+              <a:shade val="50000"/>
+            </a:schemeClr>
+          </a:lnRef>
+          <a:fillRef idx="1">
+            <a:schemeClr val="accent1"/>
+          </a:fillRef>
+          <a:effectRef idx="0">
+            <a:schemeClr val="accent1"/>
+          </a:effectRef>
+          <a:fontRef idx="minor">
+            <a:schemeClr val="lt1"/>
+          </a:fontRef>
+        </p:style>
+        <p:txBody>
+          <a:bodyPr rtlCol="0" anchor="ctr"/>
+          <a:lstStyle/>
+          <a:p>
+            <a:pPr algn="ctr"/>
+            <a:endParaRPr lang="en-US"/>
+          </a:p>
+        </p:txBody>
+      </p:sp>
+      <p:sp>
+        <p:nvSpPr>
+          <p:cNvPr id="12" name="Oval 11">
+            <a:extLst>
+              <a:ext uri="{FF2B5EF4-FFF2-40B4-BE49-F238E27FC236}">
+                <a16:creationId xmlns:a16="http://schemas.microsoft.com/office/drawing/2014/main" id="{4C30E326-ADC2-42FE-AF4C-981219AC1A55}"/>
+              </a:ext>
+            </a:extLst>
+          </p:cNvPr>
+          <p:cNvSpPr/>
+          <p:nvPr/>
+        </p:nvSpPr>
+        <p:spPr>
+          <a:xfrm rot="19050593">
+            <a:off x="7583445" y="4170507"/>
+            <a:ext cx="824485" cy="824485"/>
+          </a:xfrm>
+          <a:prstGeom prst="ellipse">
+            <a:avLst/>
+          </a:prstGeom>
+          <a:gradFill flip="none" rotWithShape="1">
+            <a:gsLst>
+              <a:gs pos="0">
+                <a:srgbClr val="FF0000">
+                  <a:alpha val="10000"/>
+                </a:srgbClr>
+              </a:gs>
+              <a:gs pos="74000">
+                <a:schemeClr val="bg1"/>
+              </a:gs>
+              <a:gs pos="83000">
+                <a:schemeClr val="bg1">
+                  <a:alpha val="54000"/>
+                </a:schemeClr>
+              </a:gs>
+              <a:gs pos="100000">
+                <a:schemeClr val="bg1">
+                  <a:alpha val="0"/>
+                </a:schemeClr>
+              </a:gs>
+            </a:gsLst>
+            <a:path path="circle">
+              <a:fillToRect r="100000" b="100000"/>
+            </a:path>
+            <a:tileRect l="-100000" t="-100000"/>
+          </a:gradFill>
+          <a:ln>
+            <a:solidFill>
+              <a:schemeClr val="tx1"/>
+            </a:solidFill>
+          </a:ln>
+        </p:spPr>
+        <p:style>
+          <a:lnRef idx="2">
+            <a:schemeClr val="accent1">
+              <a:shade val="50000"/>
+            </a:schemeClr>
+          </a:lnRef>
+          <a:fillRef idx="1">
+            <a:schemeClr val="accent1"/>
+          </a:fillRef>
+          <a:effectRef idx="0">
+            <a:schemeClr val="accent1"/>
+          </a:effectRef>
+          <a:fontRef idx="minor">
+            <a:schemeClr val="lt1"/>
+          </a:fontRef>
+        </p:style>
+        <p:txBody>
+          <a:bodyPr rtlCol="0" anchor="ctr"/>
+          <a:lstStyle/>
+          <a:p>
+            <a:pPr algn="ctr"/>
+            <a:endParaRPr lang="en-US"/>
+          </a:p>
+        </p:txBody>
+      </p:sp>
+      <p:sp>
+        <p:nvSpPr>
+          <p:cNvPr id="13" name="Oval 12">
+            <a:extLst>
+              <a:ext uri="{FF2B5EF4-FFF2-40B4-BE49-F238E27FC236}">
+                <a16:creationId xmlns:a16="http://schemas.microsoft.com/office/drawing/2014/main" id="{6D512824-9B53-4231-B191-44C117D3A5D2}"/>
+              </a:ext>
+            </a:extLst>
+          </p:cNvPr>
+          <p:cNvSpPr/>
+          <p:nvPr/>
+        </p:nvSpPr>
+        <p:spPr>
+          <a:xfrm rot="19050593">
+            <a:off x="8143404" y="4329965"/>
+            <a:ext cx="505568" cy="505568"/>
+          </a:xfrm>
+          <a:prstGeom prst="ellipse">
+            <a:avLst/>
+          </a:prstGeom>
+          <a:gradFill flip="none" rotWithShape="1">
+            <a:gsLst>
+              <a:gs pos="0">
+                <a:srgbClr val="FF0000">
+                  <a:alpha val="10000"/>
+                </a:srgbClr>
+              </a:gs>
+              <a:gs pos="74000">
+                <a:schemeClr val="bg1"/>
+              </a:gs>
+              <a:gs pos="83000">
+                <a:schemeClr val="bg1">
+                  <a:alpha val="54000"/>
+                </a:schemeClr>
+              </a:gs>
+              <a:gs pos="100000">
+                <a:schemeClr val="bg1">
+                  <a:alpha val="0"/>
+                </a:schemeClr>
+              </a:gs>
+            </a:gsLst>
+            <a:path path="circle">
+              <a:fillToRect r="100000" b="100000"/>
+            </a:path>
+            <a:tileRect l="-100000" t="-100000"/>
+          </a:gradFill>
+          <a:ln>
+            <a:solidFill>
+              <a:schemeClr val="tx1"/>
+            </a:solidFill>
+          </a:ln>
+        </p:spPr>
+        <p:style>
+          <a:lnRef idx="2">
+            <a:schemeClr val="accent1">
+              <a:shade val="50000"/>
+            </a:schemeClr>
+          </a:lnRef>
+          <a:fillRef idx="1">
+            <a:schemeClr val="accent1"/>
+          </a:fillRef>
+          <a:effectRef idx="0">
+            <a:schemeClr val="accent1"/>
+          </a:effectRef>
+          <a:fontRef idx="minor">
+            <a:schemeClr val="lt1"/>
+          </a:fontRef>
+        </p:style>
+        <p:txBody>
+          <a:bodyPr rtlCol="0" anchor="ctr"/>
+          <a:lstStyle/>
+          <a:p>
+            <a:pPr algn="ctr"/>
+            <a:endParaRPr lang="en-US"/>
+          </a:p>
+        </p:txBody>
+      </p:sp>
+      <p:cxnSp>
+        <p:nvCxnSpPr>
+          <p:cNvPr id="15" name="Straight Connector 14">
+            <a:extLst>
+              <a:ext uri="{FF2B5EF4-FFF2-40B4-BE49-F238E27FC236}">
+                <a16:creationId xmlns:a16="http://schemas.microsoft.com/office/drawing/2014/main" id="{F0F81CEA-D229-4BD6-BF85-CCE1F3ADCEA9}"/>
+              </a:ext>
+            </a:extLst>
+          </p:cNvPr>
+          <p:cNvCxnSpPr>
+            <a:cxnSpLocks/>
+            <a:stCxn id="4" idx="2"/>
+            <a:endCxn id="5" idx="0"/>
+          </p:cNvCxnSpPr>
+          <p:nvPr/>
+        </p:nvCxnSpPr>
+        <p:spPr>
+          <a:xfrm>
+            <a:off x="4125783" y="2332155"/>
+            <a:ext cx="487565" cy="403412"/>
+          </a:xfrm>
+          <a:prstGeom prst="line">
+            <a:avLst/>
+          </a:prstGeom>
+          <a:ln w="38100">
+            <a:solidFill>
+              <a:schemeClr val="tx1">
+                <a:alpha val="90000"/>
+              </a:schemeClr>
+            </a:solidFill>
+          </a:ln>
+        </p:spPr>
+        <p:style>
+          <a:lnRef idx="1">
+            <a:schemeClr val="accent1"/>
+          </a:lnRef>
+          <a:fillRef idx="0">
+            <a:schemeClr val="accent1"/>
+          </a:fillRef>
+          <a:effectRef idx="0">
+            <a:schemeClr val="accent1"/>
+          </a:effectRef>
+          <a:fontRef idx="minor">
+            <a:schemeClr val="tx1"/>
+          </a:fontRef>
+        </p:style>
+      </p:cxnSp>
+      <p:cxnSp>
+        <p:nvCxnSpPr>
+          <p:cNvPr id="17" name="Straight Connector 16">
+            <a:extLst>
+              <a:ext uri="{FF2B5EF4-FFF2-40B4-BE49-F238E27FC236}">
+                <a16:creationId xmlns:a16="http://schemas.microsoft.com/office/drawing/2014/main" id="{88F5426A-9BA9-4FD4-9BFA-69A5D94202F9}"/>
+              </a:ext>
+            </a:extLst>
+          </p:cNvPr>
+          <p:cNvCxnSpPr>
+            <a:cxnSpLocks/>
+          </p:cNvCxnSpPr>
+          <p:nvPr/>
+        </p:nvCxnSpPr>
+        <p:spPr>
+          <a:xfrm>
+            <a:off x="8021021" y="4582749"/>
+            <a:ext cx="385828" cy="0"/>
+          </a:xfrm>
+          <a:prstGeom prst="line">
+            <a:avLst/>
+          </a:prstGeom>
+          <a:ln w="38100">
+            <a:solidFill>
+              <a:schemeClr val="tx1">
+                <a:alpha val="90000"/>
+              </a:schemeClr>
+            </a:solidFill>
+          </a:ln>
+        </p:spPr>
+        <p:style>
+          <a:lnRef idx="1">
+            <a:schemeClr val="accent1"/>
+          </a:lnRef>
+          <a:fillRef idx="0">
+            <a:schemeClr val="accent1"/>
+          </a:fillRef>
+          <a:effectRef idx="0">
+            <a:schemeClr val="accent1"/>
+          </a:effectRef>
+          <a:fontRef idx="minor">
+            <a:schemeClr val="tx1"/>
+          </a:fontRef>
+        </p:style>
+      </p:cxnSp>
+      <p:cxnSp>
+        <p:nvCxnSpPr>
+          <p:cNvPr id="20" name="Straight Connector 19">
+            <a:extLst>
+              <a:ext uri="{FF2B5EF4-FFF2-40B4-BE49-F238E27FC236}">
+                <a16:creationId xmlns:a16="http://schemas.microsoft.com/office/drawing/2014/main" id="{EBD06C3C-5B80-44E8-AECB-EEC50F3C32AC}"/>
+              </a:ext>
+            </a:extLst>
+          </p:cNvPr>
+          <p:cNvCxnSpPr>
+            <a:cxnSpLocks/>
+          </p:cNvCxnSpPr>
+          <p:nvPr/>
+        </p:nvCxnSpPr>
+        <p:spPr>
+          <a:xfrm>
+            <a:off x="7619413" y="4490490"/>
+            <a:ext cx="401608" cy="92259"/>
+          </a:xfrm>
+          <a:prstGeom prst="line">
+            <a:avLst/>
+          </a:prstGeom>
+          <a:ln w="38100">
+            <a:solidFill>
+              <a:schemeClr val="tx1">
+                <a:alpha val="90000"/>
+              </a:schemeClr>
+            </a:solidFill>
+          </a:ln>
+        </p:spPr>
+        <p:style>
+          <a:lnRef idx="1">
+            <a:schemeClr val="accent1"/>
+          </a:lnRef>
+          <a:fillRef idx="0">
+            <a:schemeClr val="accent1"/>
+          </a:fillRef>
+          <a:effectRef idx="0">
+            <a:schemeClr val="accent1"/>
+          </a:effectRef>
+          <a:fontRef idx="minor">
+            <a:schemeClr val="tx1"/>
+          </a:fontRef>
+        </p:style>
+      </p:cxnSp>
+      <p:cxnSp>
+        <p:nvCxnSpPr>
+          <p:cNvPr id="25" name="Straight Connector 24">
+            <a:extLst>
+              <a:ext uri="{FF2B5EF4-FFF2-40B4-BE49-F238E27FC236}">
+                <a16:creationId xmlns:a16="http://schemas.microsoft.com/office/drawing/2014/main" id="{81E5CAF5-8852-4A09-8087-DA25CDDFCE0E}"/>
+              </a:ext>
+            </a:extLst>
+          </p:cNvPr>
+          <p:cNvCxnSpPr>
+            <a:cxnSpLocks/>
+          </p:cNvCxnSpPr>
+          <p:nvPr/>
+        </p:nvCxnSpPr>
+        <p:spPr>
+          <a:xfrm>
+            <a:off x="4602414" y="2730762"/>
+            <a:ext cx="184958" cy="727450"/>
+          </a:xfrm>
+          <a:prstGeom prst="line">
+            <a:avLst/>
+          </a:prstGeom>
+          <a:ln w="38100">
+            <a:solidFill>
+              <a:schemeClr val="tx1">
+                <a:alpha val="90000"/>
+              </a:schemeClr>
+            </a:solidFill>
+          </a:ln>
+        </p:spPr>
+        <p:style>
+          <a:lnRef idx="1">
+            <a:schemeClr val="accent1"/>
+          </a:lnRef>
+          <a:fillRef idx="0">
+            <a:schemeClr val="accent1"/>
+          </a:fillRef>
+          <a:effectRef idx="0">
+            <a:schemeClr val="accent1"/>
+          </a:effectRef>
+          <a:fontRef idx="minor">
+            <a:schemeClr val="tx1"/>
+          </a:fontRef>
+        </p:style>
+      </p:cxnSp>
+      <p:cxnSp>
+        <p:nvCxnSpPr>
+          <p:cNvPr id="27" name="Straight Connector 26">
+            <a:extLst>
+              <a:ext uri="{FF2B5EF4-FFF2-40B4-BE49-F238E27FC236}">
+                <a16:creationId xmlns:a16="http://schemas.microsoft.com/office/drawing/2014/main" id="{E853DD7A-A0F3-45AB-9A47-AAE4E21DF98A}"/>
+              </a:ext>
+            </a:extLst>
+          </p:cNvPr>
+          <p:cNvCxnSpPr>
+            <a:cxnSpLocks/>
+          </p:cNvCxnSpPr>
+          <p:nvPr/>
+        </p:nvCxnSpPr>
+        <p:spPr>
+          <a:xfrm>
+            <a:off x="4765612" y="3446173"/>
+            <a:ext cx="725073" cy="0"/>
+          </a:xfrm>
+          <a:prstGeom prst="line">
+            <a:avLst/>
+          </a:prstGeom>
+          <a:ln w="38100">
+            <a:solidFill>
+              <a:schemeClr val="tx1">
+                <a:alpha val="90000"/>
+              </a:schemeClr>
+            </a:solidFill>
+          </a:ln>
+        </p:spPr>
+        <p:style>
+          <a:lnRef idx="1">
+            <a:schemeClr val="accent1"/>
+          </a:lnRef>
+          <a:fillRef idx="0">
+            <a:schemeClr val="accent1"/>
+          </a:fillRef>
+          <a:effectRef idx="0">
+            <a:schemeClr val="accent1"/>
+          </a:effectRef>
+          <a:fontRef idx="minor">
+            <a:schemeClr val="tx1"/>
+          </a:fontRef>
+        </p:style>
+      </p:cxnSp>
+      <p:cxnSp>
+        <p:nvCxnSpPr>
+          <p:cNvPr id="29" name="Straight Connector 28">
+            <a:extLst>
+              <a:ext uri="{FF2B5EF4-FFF2-40B4-BE49-F238E27FC236}">
+                <a16:creationId xmlns:a16="http://schemas.microsoft.com/office/drawing/2014/main" id="{EB1C44CB-8128-4F1B-A473-33469968CF6B}"/>
+              </a:ext>
+            </a:extLst>
+          </p:cNvPr>
+          <p:cNvCxnSpPr>
+            <a:cxnSpLocks/>
+          </p:cNvCxnSpPr>
+          <p:nvPr/>
+        </p:nvCxnSpPr>
+        <p:spPr>
+          <a:xfrm>
+            <a:off x="5483813" y="3444081"/>
+            <a:ext cx="819518" cy="0"/>
+          </a:xfrm>
+          <a:prstGeom prst="line">
+            <a:avLst/>
+          </a:prstGeom>
+          <a:ln w="38100">
+            <a:solidFill>
+              <a:schemeClr val="tx1">
+                <a:alpha val="90000"/>
+              </a:schemeClr>
+            </a:solidFill>
+          </a:ln>
+        </p:spPr>
+        <p:style>
+          <a:lnRef idx="1">
+            <a:schemeClr val="accent1"/>
+          </a:lnRef>
+          <a:fillRef idx="0">
+            <a:schemeClr val="accent1"/>
+          </a:fillRef>
+          <a:effectRef idx="0">
+            <a:schemeClr val="accent1"/>
+          </a:effectRef>
+          <a:fontRef idx="minor">
+            <a:schemeClr val="tx1"/>
+          </a:fontRef>
+        </p:style>
+      </p:cxnSp>
+      <p:cxnSp>
+        <p:nvCxnSpPr>
+          <p:cNvPr id="32" name="Straight Connector 31">
+            <a:extLst>
+              <a:ext uri="{FF2B5EF4-FFF2-40B4-BE49-F238E27FC236}">
+                <a16:creationId xmlns:a16="http://schemas.microsoft.com/office/drawing/2014/main" id="{F47DBAE8-71A6-491A-ACA3-A074D6155881}"/>
+              </a:ext>
+            </a:extLst>
+          </p:cNvPr>
+          <p:cNvCxnSpPr>
+            <a:cxnSpLocks/>
+          </p:cNvCxnSpPr>
+          <p:nvPr/>
+        </p:nvCxnSpPr>
+        <p:spPr>
+          <a:xfrm flipV="1">
+            <a:off x="6301628" y="3033758"/>
+            <a:ext cx="751645" cy="408930"/>
+          </a:xfrm>
+          <a:prstGeom prst="line">
+            <a:avLst/>
+          </a:prstGeom>
+          <a:ln w="38100">
+            <a:solidFill>
+              <a:schemeClr val="tx1">
+                <a:alpha val="90000"/>
+              </a:schemeClr>
+            </a:solidFill>
+          </a:ln>
+        </p:spPr>
+        <p:style>
+          <a:lnRef idx="1">
+            <a:schemeClr val="accent1"/>
+          </a:lnRef>
+          <a:fillRef idx="0">
+            <a:schemeClr val="accent1"/>
+          </a:fillRef>
+          <a:effectRef idx="0">
+            <a:schemeClr val="accent1"/>
+          </a:effectRef>
+          <a:fontRef idx="minor">
+            <a:schemeClr val="tx1"/>
+          </a:fontRef>
+        </p:style>
+      </p:cxnSp>
+      <p:cxnSp>
+        <p:nvCxnSpPr>
+          <p:cNvPr id="34" name="Straight Connector 33">
+            <a:extLst>
+              <a:ext uri="{FF2B5EF4-FFF2-40B4-BE49-F238E27FC236}">
+                <a16:creationId xmlns:a16="http://schemas.microsoft.com/office/drawing/2014/main" id="{DA8E61FF-AE05-44C5-8E43-FA6EDBCB67FF}"/>
+              </a:ext>
+            </a:extLst>
+          </p:cNvPr>
+          <p:cNvCxnSpPr>
+            <a:cxnSpLocks/>
+          </p:cNvCxnSpPr>
+          <p:nvPr/>
+        </p:nvCxnSpPr>
+        <p:spPr>
+          <a:xfrm>
+            <a:off x="7048738" y="3031769"/>
+            <a:ext cx="201128" cy="559515"/>
+          </a:xfrm>
+          <a:prstGeom prst="line">
+            <a:avLst/>
+          </a:prstGeom>
+          <a:ln w="38100">
+            <a:solidFill>
+              <a:schemeClr val="tx1">
+                <a:alpha val="90000"/>
+              </a:schemeClr>
+            </a:solidFill>
+          </a:ln>
+        </p:spPr>
+        <p:style>
+          <a:lnRef idx="1">
+            <a:schemeClr val="accent1"/>
+          </a:lnRef>
+          <a:fillRef idx="0">
+            <a:schemeClr val="accent1"/>
+          </a:fillRef>
+          <a:effectRef idx="0">
+            <a:schemeClr val="accent1"/>
+          </a:effectRef>
+          <a:fontRef idx="minor">
+            <a:schemeClr val="tx1"/>
+          </a:fontRef>
+        </p:style>
+      </p:cxnSp>
+      <p:cxnSp>
+        <p:nvCxnSpPr>
+          <p:cNvPr id="36" name="Straight Connector 35">
+            <a:extLst>
+              <a:ext uri="{FF2B5EF4-FFF2-40B4-BE49-F238E27FC236}">
+                <a16:creationId xmlns:a16="http://schemas.microsoft.com/office/drawing/2014/main" id="{30A5B2E3-8927-4FFE-8B95-99A1B1ED23F8}"/>
+              </a:ext>
+            </a:extLst>
+          </p:cNvPr>
+          <p:cNvCxnSpPr>
+            <a:cxnSpLocks/>
+          </p:cNvCxnSpPr>
+          <p:nvPr/>
+        </p:nvCxnSpPr>
+        <p:spPr>
+          <a:xfrm>
+            <a:off x="7236073" y="3570961"/>
+            <a:ext cx="177174" cy="504602"/>
+          </a:xfrm>
+          <a:prstGeom prst="line">
+            <a:avLst/>
+          </a:prstGeom>
+          <a:ln w="38100">
+            <a:solidFill>
+              <a:schemeClr val="tx1">
+                <a:alpha val="90000"/>
+              </a:schemeClr>
+            </a:solidFill>
+          </a:ln>
+        </p:spPr>
+        <p:style>
+          <a:lnRef idx="1">
+            <a:schemeClr val="accent1"/>
+          </a:lnRef>
+          <a:fillRef idx="0">
+            <a:schemeClr val="accent1"/>
+          </a:fillRef>
+          <a:effectRef idx="0">
+            <a:schemeClr val="accent1"/>
+          </a:effectRef>
+          <a:fontRef idx="minor">
+            <a:schemeClr val="tx1"/>
+          </a:fontRef>
+        </p:style>
+      </p:cxnSp>
+      <p:cxnSp>
+        <p:nvCxnSpPr>
+          <p:cNvPr id="38" name="Straight Connector 37">
+            <a:extLst>
+              <a:ext uri="{FF2B5EF4-FFF2-40B4-BE49-F238E27FC236}">
+                <a16:creationId xmlns:a16="http://schemas.microsoft.com/office/drawing/2014/main" id="{CCA76708-AE32-469B-8E6A-13159A5F5B93}"/>
+              </a:ext>
+            </a:extLst>
+          </p:cNvPr>
+          <p:cNvCxnSpPr>
+            <a:cxnSpLocks/>
+          </p:cNvCxnSpPr>
+          <p:nvPr/>
+        </p:nvCxnSpPr>
+        <p:spPr>
+          <a:xfrm>
+            <a:off x="7406920" y="4037229"/>
+            <a:ext cx="231211" cy="450518"/>
+          </a:xfrm>
+          <a:prstGeom prst="line">
+            <a:avLst/>
+          </a:prstGeom>
+          <a:ln w="38100">
+            <a:solidFill>
+              <a:schemeClr val="tx1">
+                <a:alpha val="90000"/>
+              </a:schemeClr>
+            </a:solidFill>
+          </a:ln>
+        </p:spPr>
+        <p:style>
+          <a:lnRef idx="1">
+            <a:schemeClr val="accent1"/>
+          </a:lnRef>
+          <a:fillRef idx="0">
+            <a:schemeClr val="accent1"/>
+          </a:fillRef>
+          <a:effectRef idx="0">
+            <a:schemeClr val="accent1"/>
+          </a:effectRef>
+          <a:fontRef idx="minor">
+            <a:schemeClr val="tx1"/>
+          </a:fontRef>
+        </p:style>
+      </p:cxnSp>
+      <p:sp>
+        <p:nvSpPr>
+          <p:cNvPr id="44" name="Rectangle 43">
+            <a:extLst>
+              <a:ext uri="{FF2B5EF4-FFF2-40B4-BE49-F238E27FC236}">
+                <a16:creationId xmlns:a16="http://schemas.microsoft.com/office/drawing/2014/main" id="{66328380-718C-41CA-9310-4F34E4F7419D}"/>
+              </a:ext>
+            </a:extLst>
+          </p:cNvPr>
+          <p:cNvSpPr/>
+          <p:nvPr/>
+        </p:nvSpPr>
+        <p:spPr>
+          <a:xfrm>
+            <a:off x="3727544" y="4634219"/>
+            <a:ext cx="2039944" cy="291678"/>
+          </a:xfrm>
+          <a:prstGeom prst="rect">
+            <a:avLst/>
+          </a:prstGeom>
+          <a:gradFill flip="none" rotWithShape="1">
+            <a:gsLst>
+              <a:gs pos="0">
+                <a:srgbClr val="FF0000">
+                  <a:alpha val="50000"/>
+                </a:srgbClr>
+              </a:gs>
+              <a:gs pos="47000">
+                <a:srgbClr val="FF0000">
+                  <a:alpha val="25000"/>
+                </a:srgbClr>
+              </a:gs>
+              <a:gs pos="82000">
+                <a:srgbClr val="FF0000">
+                  <a:alpha val="10000"/>
+                </a:srgbClr>
+              </a:gs>
+              <a:gs pos="100000">
+                <a:schemeClr val="bg1">
+                  <a:alpha val="0"/>
+                </a:schemeClr>
+              </a:gs>
+            </a:gsLst>
+            <a:lin ang="0" scaled="0"/>
+            <a:tileRect/>
+          </a:gradFill>
+        </p:spPr>
+        <p:style>
+          <a:lnRef idx="2">
+            <a:schemeClr val="accent1">
+              <a:shade val="50000"/>
+            </a:schemeClr>
+          </a:lnRef>
+          <a:fillRef idx="1">
+            <a:schemeClr val="accent1"/>
+          </a:fillRef>
+          <a:effectRef idx="0">
+            <a:schemeClr val="accent1"/>
+          </a:effectRef>
+          <a:fontRef idx="minor">
+            <a:schemeClr val="lt1"/>
+          </a:fontRef>
+        </p:style>
+        <p:txBody>
+          <a:bodyPr rtlCol="0" anchor="ctr"/>
+          <a:lstStyle/>
+          <a:p>
+            <a:pPr algn="ctr"/>
+            <a:endParaRPr lang="en-US"/>
+          </a:p>
+        </p:txBody>
+      </p:sp>
+      <p:sp>
+        <p:nvSpPr>
+          <p:cNvPr id="45" name="TextBox 44">
+            <a:extLst>
+              <a:ext uri="{FF2B5EF4-FFF2-40B4-BE49-F238E27FC236}">
+                <a16:creationId xmlns:a16="http://schemas.microsoft.com/office/drawing/2014/main" id="{FD426F0E-583C-4DA5-B38F-14A80EE9C0CA}"/>
+              </a:ext>
+            </a:extLst>
+          </p:cNvPr>
+          <p:cNvSpPr txBox="1"/>
+          <p:nvPr/>
+        </p:nvSpPr>
+        <p:spPr>
+          <a:xfrm>
+            <a:off x="2403782" y="4544248"/>
+            <a:ext cx="1627517" cy="461665"/>
+          </a:xfrm>
+          <a:prstGeom prst="rect">
+            <a:avLst/>
+          </a:prstGeom>
+          <a:noFill/>
+        </p:spPr>
+        <p:txBody>
+          <a:bodyPr wrap="square" rtlCol="0">
+            <a:spAutoFit/>
+          </a:bodyPr>
+          <a:lstStyle/>
+          <a:p>
+            <a:pPr algn="ctr"/>
+            <a:r>
+              <a:rPr lang="en-US" sz="2400" dirty="0"/>
+              <a:t>Ascent</a:t>
+            </a:r>
+          </a:p>
+        </p:txBody>
+      </p:sp>
+      <p:sp>
+        <p:nvSpPr>
+          <p:cNvPr id="46" name="TextBox 45">
+            <a:extLst>
+              <a:ext uri="{FF2B5EF4-FFF2-40B4-BE49-F238E27FC236}">
+                <a16:creationId xmlns:a16="http://schemas.microsoft.com/office/drawing/2014/main" id="{6281F88B-6835-48AE-9B48-7687E06072E9}"/>
+              </a:ext>
+            </a:extLst>
+          </p:cNvPr>
+          <p:cNvSpPr txBox="1"/>
+          <p:nvPr/>
+        </p:nvSpPr>
+        <p:spPr>
+          <a:xfrm>
+            <a:off x="5611111" y="4544247"/>
+            <a:ext cx="1627517" cy="461665"/>
+          </a:xfrm>
+          <a:prstGeom prst="rect">
+            <a:avLst/>
+          </a:prstGeom>
+          <a:noFill/>
+        </p:spPr>
+        <p:txBody>
+          <a:bodyPr wrap="square" rtlCol="0">
+            <a:spAutoFit/>
+          </a:bodyPr>
+          <a:lstStyle/>
+          <a:p>
+            <a:pPr algn="ctr"/>
+            <a:r>
+              <a:rPr lang="en-US" sz="2400" dirty="0"/>
+              <a:t>Descent</a:t>
+            </a:r>
+          </a:p>
+        </p:txBody>
+      </p:sp>
+      <p:cxnSp>
+        <p:nvCxnSpPr>
+          <p:cNvPr id="48" name="Straight Arrow Connector 47">
+            <a:extLst>
+              <a:ext uri="{FF2B5EF4-FFF2-40B4-BE49-F238E27FC236}">
+                <a16:creationId xmlns:a16="http://schemas.microsoft.com/office/drawing/2014/main" id="{2D3FB083-B7B8-41F1-9AD4-C2B761059083}"/>
+              </a:ext>
+            </a:extLst>
+          </p:cNvPr>
+          <p:cNvCxnSpPr>
+            <a:cxnSpLocks/>
+          </p:cNvCxnSpPr>
+          <p:nvPr/>
+        </p:nvCxnSpPr>
+        <p:spPr>
+          <a:xfrm flipH="1">
+            <a:off x="4188129" y="1544394"/>
+            <a:ext cx="1097280" cy="731520"/>
+          </a:xfrm>
+          <a:prstGeom prst="straightConnector1">
+            <a:avLst/>
+          </a:prstGeom>
+          <a:ln w="25400">
+            <a:solidFill>
+              <a:schemeClr val="tx1"/>
+            </a:solidFill>
+            <a:prstDash val="dash"/>
+            <a:headEnd type="none" w="med" len="med"/>
+            <a:tailEnd type="triangle" w="lg" len="lg"/>
+          </a:ln>
+        </p:spPr>
+        <p:style>
+          <a:lnRef idx="1">
+            <a:schemeClr val="accent1"/>
+          </a:lnRef>
+          <a:fillRef idx="0">
+            <a:schemeClr val="accent1"/>
+          </a:fillRef>
+          <a:effectRef idx="0">
+            <a:schemeClr val="accent1"/>
+          </a:effectRef>
+          <a:fontRef idx="minor">
+            <a:schemeClr val="tx1"/>
+          </a:fontRef>
+        </p:style>
+      </p:cxnSp>
+      <p:sp>
+        <p:nvSpPr>
+          <p:cNvPr id="50" name="TextBox 49">
+            <a:extLst>
+              <a:ext uri="{FF2B5EF4-FFF2-40B4-BE49-F238E27FC236}">
+                <a16:creationId xmlns:a16="http://schemas.microsoft.com/office/drawing/2014/main" id="{5538A7A4-575B-4EB7-969C-9731F21D999A}"/>
+              </a:ext>
+            </a:extLst>
+          </p:cNvPr>
+          <p:cNvSpPr txBox="1"/>
+          <p:nvPr/>
+        </p:nvSpPr>
+        <p:spPr>
+          <a:xfrm>
+            <a:off x="5227312" y="1274234"/>
+            <a:ext cx="2081956" cy="461665"/>
+          </a:xfrm>
+          <a:prstGeom prst="rect">
+            <a:avLst/>
+          </a:prstGeom>
+          <a:noFill/>
+        </p:spPr>
+        <p:txBody>
+          <a:bodyPr wrap="square" rtlCol="0">
+            <a:spAutoFit/>
+          </a:bodyPr>
+          <a:lstStyle/>
+          <a:p>
+            <a:pPr algn="ctr"/>
+            <a:r>
+              <a:rPr lang="en-US" sz="2400" dirty="0"/>
+              <a:t>Initial Guess</a:t>
+            </a:r>
+          </a:p>
+        </p:txBody>
+      </p:sp>
+      <p:cxnSp>
+        <p:nvCxnSpPr>
+          <p:cNvPr id="51" name="Straight Arrow Connector 50">
+            <a:extLst>
+              <a:ext uri="{FF2B5EF4-FFF2-40B4-BE49-F238E27FC236}">
+                <a16:creationId xmlns:a16="http://schemas.microsoft.com/office/drawing/2014/main" id="{B615DF10-D7AF-45D3-ACC3-BFF0C10DF660}"/>
+              </a:ext>
+            </a:extLst>
+          </p:cNvPr>
+          <p:cNvCxnSpPr>
+            <a:cxnSpLocks/>
+          </p:cNvCxnSpPr>
+          <p:nvPr/>
+        </p:nvCxnSpPr>
+        <p:spPr>
+          <a:xfrm flipH="1">
+            <a:off x="8436944" y="3951281"/>
+            <a:ext cx="822960" cy="548640"/>
+          </a:xfrm>
+          <a:prstGeom prst="straightConnector1">
+            <a:avLst/>
+          </a:prstGeom>
+          <a:ln w="25400">
+            <a:solidFill>
+              <a:schemeClr val="tx1"/>
+            </a:solidFill>
+            <a:prstDash val="dash"/>
+            <a:headEnd type="none" w="med" len="med"/>
+            <a:tailEnd type="triangle" w="lg" len="lg"/>
+          </a:ln>
+        </p:spPr>
+        <p:style>
+          <a:lnRef idx="1">
+            <a:schemeClr val="accent1"/>
+          </a:lnRef>
+          <a:fillRef idx="0">
+            <a:schemeClr val="accent1"/>
+          </a:fillRef>
+          <a:effectRef idx="0">
+            <a:schemeClr val="accent1"/>
+          </a:effectRef>
+          <a:fontRef idx="minor">
+            <a:schemeClr val="tx1"/>
+          </a:fontRef>
+        </p:style>
+      </p:cxnSp>
+      <p:sp>
+        <p:nvSpPr>
+          <p:cNvPr id="54" name="TextBox 53">
+            <a:extLst>
+              <a:ext uri="{FF2B5EF4-FFF2-40B4-BE49-F238E27FC236}">
+                <a16:creationId xmlns:a16="http://schemas.microsoft.com/office/drawing/2014/main" id="{AA7FE8EC-C274-4CD9-814C-44BAF4A7C920}"/>
+              </a:ext>
+            </a:extLst>
+          </p:cNvPr>
+          <p:cNvSpPr txBox="1"/>
+          <p:nvPr/>
+        </p:nvSpPr>
+        <p:spPr>
+          <a:xfrm>
+            <a:off x="8250957" y="3465102"/>
+            <a:ext cx="2081956" cy="461665"/>
+          </a:xfrm>
+          <a:prstGeom prst="rect">
+            <a:avLst/>
+          </a:prstGeom>
+          <a:noFill/>
+        </p:spPr>
+        <p:txBody>
+          <a:bodyPr wrap="square" rtlCol="0">
+            <a:spAutoFit/>
+          </a:bodyPr>
+          <a:lstStyle/>
+          <a:p>
+            <a:pPr algn="ctr"/>
+            <a:r>
+              <a:rPr lang="en-US" sz="2400" dirty="0"/>
+              <a:t>Final Point</a:t>
+            </a:r>
+          </a:p>
+        </p:txBody>
+      </p:sp>
+      <p:cxnSp>
+        <p:nvCxnSpPr>
+          <p:cNvPr id="56" name="Straight Arrow Connector 55">
+            <a:extLst>
+              <a:ext uri="{FF2B5EF4-FFF2-40B4-BE49-F238E27FC236}">
+                <a16:creationId xmlns:a16="http://schemas.microsoft.com/office/drawing/2014/main" id="{D8E6C2A4-2A27-45A7-AC5F-38C82449E0BE}"/>
+              </a:ext>
+            </a:extLst>
+          </p:cNvPr>
+          <p:cNvCxnSpPr>
+            <a:cxnSpLocks/>
+          </p:cNvCxnSpPr>
+          <p:nvPr/>
+        </p:nvCxnSpPr>
+        <p:spPr>
+          <a:xfrm flipH="1">
+            <a:off x="7627560" y="2413250"/>
+            <a:ext cx="822960" cy="548640"/>
+          </a:xfrm>
+          <a:prstGeom prst="straightConnector1">
+            <a:avLst/>
+          </a:prstGeom>
+          <a:ln w="25400">
+            <a:solidFill>
+              <a:schemeClr val="tx1"/>
+            </a:solidFill>
+            <a:prstDash val="dash"/>
+            <a:headEnd type="none" w="med" len="med"/>
+            <a:tailEnd type="triangle" w="lg" len="lg"/>
+          </a:ln>
+        </p:spPr>
+        <p:style>
+          <a:lnRef idx="1">
+            <a:schemeClr val="accent1"/>
+          </a:lnRef>
+          <a:fillRef idx="0">
+            <a:schemeClr val="accent1"/>
+          </a:fillRef>
+          <a:effectRef idx="0">
+            <a:schemeClr val="accent1"/>
+          </a:effectRef>
+          <a:fontRef idx="minor">
+            <a:schemeClr val="tx1"/>
+          </a:fontRef>
+        </p:style>
+      </p:cxnSp>
+      <p:sp>
+        <p:nvSpPr>
+          <p:cNvPr id="57" name="TextBox 56">
+            <a:extLst>
+              <a:ext uri="{FF2B5EF4-FFF2-40B4-BE49-F238E27FC236}">
+                <a16:creationId xmlns:a16="http://schemas.microsoft.com/office/drawing/2014/main" id="{BD24805B-E1E0-470C-B722-AB1586224DEE}"/>
+              </a:ext>
+            </a:extLst>
+          </p:cNvPr>
+          <p:cNvSpPr txBox="1"/>
+          <p:nvPr/>
+        </p:nvSpPr>
+        <p:spPr>
+          <a:xfrm>
+            <a:off x="6804808" y="1912087"/>
+            <a:ext cx="3392137" cy="461665"/>
+          </a:xfrm>
+          <a:prstGeom prst="rect">
+            <a:avLst/>
+          </a:prstGeom>
+          <a:noFill/>
+        </p:spPr>
+        <p:txBody>
+          <a:bodyPr wrap="square" rtlCol="0">
+            <a:spAutoFit/>
+          </a:bodyPr>
+          <a:lstStyle/>
+          <a:p>
+            <a:pPr algn="ctr"/>
+            <a:r>
+              <a:rPr lang="en-US" sz="2400" dirty="0"/>
+              <a:t>Trust-Region Boundary</a:t>
+            </a:r>
+          </a:p>
+        </p:txBody>
+      </p:sp>
     </p:spTree>
     <p:extLst>
       <p:ext uri="{BB962C8B-B14F-4D97-AF65-F5344CB8AC3E}">

</xml_diff>